<commit_message>
se concatena claveEstado con claveMunicipio en el reporte de Excel Sedesol
</commit_message>
<xml_diff>
--- a/djangoISSSTE/static/ppt/ppt-generados/balance_accion_1.pptx
+++ b/djangoISSSTE/static/ppt/ppt-generados/balance_accion_1.pptx
@@ -7621,7 +7621,7 @@
                         </a:defRPr>
                       </a:pPr>
                       <a:r>
-                        <a:t>$ 126,703,040.0</a:t>
+                        <a:t>$ 126,747,865.0</a:t>
                       </a:r>
                       <a:endParaRPr lang="es-MX" sz="1400" kern="1200" dirty="0">
                         <a:solidFill>
@@ -7960,7 +7960,7 @@
                         </a:defRPr>
                       </a:pPr>
                       <a:r>
-                        <a:t>$ 421,067,977.5</a:t>
+                        <a:t>$ 2,163,527,418.0</a:t>
                       </a:r>
                       <a:endParaRPr lang="es-MX" sz="1400" kern="1200" dirty="0">
                         <a:solidFill>
@@ -8303,7 +8303,7 @@
                         </a:defRPr>
                       </a:pPr>
                       <a:r>
-                        <a:t>$ 15,352,699.1758</a:t>
+                        <a:t>$ 18,665,262.0</a:t>
                       </a:r>
                       <a:endParaRPr lang="es-MX" sz="1400" kern="1200" dirty="0">
                         <a:solidFill>
@@ -8646,7 +8646,7 @@
                         </a:defRPr>
                       </a:pPr>
                       <a:r>
-                        <a:t>$ 133,218,332.562</a:t>
+                        <a:t>$ 141,053,358.0</a:t>
                       </a:r>
                       <a:endParaRPr lang="es-MX" sz="1400" kern="1200" dirty="0">
                         <a:solidFill>
@@ -8990,7 +8990,7 @@
                         </a:defRPr>
                       </a:pPr>
                       <a:r>
-                        <a:t>$ 798,300.0</a:t>
+                        <a:t>$ 3,522,300.0</a:t>
                       </a:r>
                       <a:endParaRPr lang="es-MX" sz="1400" kern="1200" dirty="0">
                         <a:solidFill>
@@ -9336,7 +9336,7 @@
                         </a:defRPr>
                       </a:pPr>
                       <a:r>
-                        <a:t>$ 554,066,874.5</a:t>
+                        <a:t>$ 554,066,873.28</a:t>
                       </a:r>
                       <a:endParaRPr lang="es-MX" sz="1400" kern="1200" dirty="0">
                         <a:solidFill>
@@ -9682,7 +9682,7 @@
                         </a:defRPr>
                       </a:pPr>
                       <a:r>
-                        <a:t>$ 554,066,874.5</a:t>
+                        <a:t>$ 544,601,568.0</a:t>
                       </a:r>
                       <a:endParaRPr lang="es-MX" sz="1400" kern="1200" dirty="0">
                         <a:solidFill>
@@ -10028,7 +10028,7 @@
                         </a:defRPr>
                       </a:pPr>
                       <a:r>
-                        <a:t>$ 236,016,271.375</a:t>
+                        <a:t>$ 237,599,981.85</a:t>
                       </a:r>
                       <a:endParaRPr lang="es-MX" sz="1400" kern="1200" dirty="0">
                         <a:solidFill>
@@ -10368,7 +10368,7 @@
                         </a:defRPr>
                       </a:pPr>
                       <a:r>
-                        <a:t>$ 2,041,290,369.61</a:t>
+                        <a:t>$ 3,789,784,626.13</a:t>
                       </a:r>
                       <a:endParaRPr lang="es-MX" sz="1400" kern="1200" dirty="0">
                         <a:solidFill>

</xml_diff>